<commit_message>
added postal code to address
</commit_message>
<xml_diff>
--- a/documentation/ER Diagram/ER Diagram - Project - COMP3005.pptx
+++ b/documentation/ER Diagram/ER Diagram - Project - COMP3005.pptx
@@ -223,7 +223,7 @@
           <a:p>
             <a:fld id="{4EEA96E3-5376-2D42-97CA-66A886050071}" type="datetimeFigureOut">
               <a:rPr lang="en-US" smtClean="0"/>
-              <a:t>3/22/20</a:t>
+              <a:t>3/24/20</a:t>
             </a:fld>
             <a:endParaRPr lang="en-US"/>
           </a:p>
@@ -465,7 +465,7 @@
           <a:p>
             <a:fld id="{3BD378E5-F4D9-824D-8BC6-66DDB52D5CFC}" type="datetimeFigureOut">
               <a:rPr lang="en-US" smtClean="0"/>
-              <a:t>3/22/20</a:t>
+              <a:t>3/24/20</a:t>
             </a:fld>
             <a:endParaRPr lang="en-US"/>
           </a:p>
@@ -663,7 +663,7 @@
           <a:p>
             <a:fld id="{3BD378E5-F4D9-824D-8BC6-66DDB52D5CFC}" type="datetimeFigureOut">
               <a:rPr lang="en-US" smtClean="0"/>
-              <a:t>3/22/20</a:t>
+              <a:t>3/24/20</a:t>
             </a:fld>
             <a:endParaRPr lang="en-US"/>
           </a:p>
@@ -871,7 +871,7 @@
           <a:p>
             <a:fld id="{3BD378E5-F4D9-824D-8BC6-66DDB52D5CFC}" type="datetimeFigureOut">
               <a:rPr lang="en-US" smtClean="0"/>
-              <a:t>3/22/20</a:t>
+              <a:t>3/24/20</a:t>
             </a:fld>
             <a:endParaRPr lang="en-US"/>
           </a:p>
@@ -1069,7 +1069,7 @@
           <a:p>
             <a:fld id="{3BD378E5-F4D9-824D-8BC6-66DDB52D5CFC}" type="datetimeFigureOut">
               <a:rPr lang="en-US" smtClean="0"/>
-              <a:t>3/22/20</a:t>
+              <a:t>3/24/20</a:t>
             </a:fld>
             <a:endParaRPr lang="en-US"/>
           </a:p>
@@ -1344,7 +1344,7 @@
           <a:p>
             <a:fld id="{3BD378E5-F4D9-824D-8BC6-66DDB52D5CFC}" type="datetimeFigureOut">
               <a:rPr lang="en-US" smtClean="0"/>
-              <a:t>3/22/20</a:t>
+              <a:t>3/24/20</a:t>
             </a:fld>
             <a:endParaRPr lang="en-US"/>
           </a:p>
@@ -1609,7 +1609,7 @@
           <a:p>
             <a:fld id="{3BD378E5-F4D9-824D-8BC6-66DDB52D5CFC}" type="datetimeFigureOut">
               <a:rPr lang="en-US" smtClean="0"/>
-              <a:t>3/22/20</a:t>
+              <a:t>3/24/20</a:t>
             </a:fld>
             <a:endParaRPr lang="en-US"/>
           </a:p>
@@ -2021,7 +2021,7 @@
           <a:p>
             <a:fld id="{3BD378E5-F4D9-824D-8BC6-66DDB52D5CFC}" type="datetimeFigureOut">
               <a:rPr lang="en-US" smtClean="0"/>
-              <a:t>3/22/20</a:t>
+              <a:t>3/24/20</a:t>
             </a:fld>
             <a:endParaRPr lang="en-US"/>
           </a:p>
@@ -2162,7 +2162,7 @@
           <a:p>
             <a:fld id="{3BD378E5-F4D9-824D-8BC6-66DDB52D5CFC}" type="datetimeFigureOut">
               <a:rPr lang="en-US" smtClean="0"/>
-              <a:t>3/22/20</a:t>
+              <a:t>3/24/20</a:t>
             </a:fld>
             <a:endParaRPr lang="en-US"/>
           </a:p>
@@ -2275,7 +2275,7 @@
           <a:p>
             <a:fld id="{3BD378E5-F4D9-824D-8BC6-66DDB52D5CFC}" type="datetimeFigureOut">
               <a:rPr lang="en-US" smtClean="0"/>
-              <a:t>3/22/20</a:t>
+              <a:t>3/24/20</a:t>
             </a:fld>
             <a:endParaRPr lang="en-US"/>
           </a:p>
@@ -2586,7 +2586,7 @@
           <a:p>
             <a:fld id="{3BD378E5-F4D9-824D-8BC6-66DDB52D5CFC}" type="datetimeFigureOut">
               <a:rPr lang="en-US" smtClean="0"/>
-              <a:t>3/22/20</a:t>
+              <a:t>3/24/20</a:t>
             </a:fld>
             <a:endParaRPr lang="en-US"/>
           </a:p>
@@ -2874,7 +2874,7 @@
           <a:p>
             <a:fld id="{3BD378E5-F4D9-824D-8BC6-66DDB52D5CFC}" type="datetimeFigureOut">
               <a:rPr lang="en-US" smtClean="0"/>
-              <a:t>3/22/20</a:t>
+              <a:t>3/24/20</a:t>
             </a:fld>
             <a:endParaRPr lang="en-US"/>
           </a:p>
@@ -3115,7 +3115,7 @@
           <a:p>
             <a:fld id="{3BD378E5-F4D9-824D-8BC6-66DDB52D5CFC}" type="datetimeFigureOut">
               <a:rPr lang="en-US" smtClean="0"/>
-              <a:t>3/22/20</a:t>
+              <a:t>3/24/20</a:t>
             </a:fld>
             <a:endParaRPr lang="en-US"/>
           </a:p>
@@ -3547,13 +3547,13 @@
           <p:nvPr>
             <p:extLst>
               <p:ext uri="{D42A27DB-BD31-4B8C-83A1-F6EECF244321}">
-                <p14:modId xmlns:p14="http://schemas.microsoft.com/office/powerpoint/2010/main" val="3249792611"/>
+                <p14:modId xmlns:p14="http://schemas.microsoft.com/office/powerpoint/2010/main" val="3094236384"/>
               </p:ext>
             </p:extLst>
           </p:nvPr>
         </p:nvGraphicFramePr>
         <p:xfrm>
-          <a:off x="4390720" y="36146"/>
+          <a:off x="4390720" y="37200"/>
           <a:ext cx="1210788" cy="1828800"/>
         </p:xfrm>
         <a:graphic>
@@ -4247,8 +4247,8 @@
         </p:nvCxnSpPr>
         <p:spPr>
           <a:xfrm rot="10800000">
-            <a:off x="4996114" y="1864946"/>
-            <a:ext cx="3190592" cy="1087592"/>
+            <a:off x="4996114" y="1866000"/>
+            <a:ext cx="3190592" cy="1086538"/>
           </a:xfrm>
           <a:prstGeom prst="bentConnector2">
             <a:avLst/>
@@ -4416,13 +4416,13 @@
           <p:nvPr>
             <p:extLst>
               <p:ext uri="{D42A27DB-BD31-4B8C-83A1-F6EECF244321}">
-                <p14:modId xmlns:p14="http://schemas.microsoft.com/office/powerpoint/2010/main" val="713185181"/>
+                <p14:modId xmlns:p14="http://schemas.microsoft.com/office/powerpoint/2010/main" val="622675927"/>
               </p:ext>
             </p:extLst>
           </p:nvPr>
         </p:nvGraphicFramePr>
         <p:xfrm>
-          <a:off x="7248500" y="592034"/>
+          <a:off x="6536704" y="674312"/>
           <a:ext cx="1210788" cy="554574"/>
         </p:xfrm>
         <a:graphic>
@@ -4715,7 +4715,7 @@
         </p:nvGrpSpPr>
         <p:grpSpPr>
           <a:xfrm rot="16200000">
-            <a:off x="6039400" y="427990"/>
+            <a:off x="6039400" y="507295"/>
             <a:ext cx="78253" cy="888611"/>
             <a:chOff x="4991321" y="1224855"/>
             <a:chExt cx="45719" cy="852211"/>
@@ -4818,44 +4818,6 @@
           </p:style>
         </p:cxnSp>
       </p:grpSp>
-      <p:cxnSp>
-        <p:nvCxnSpPr>
-          <p:cNvPr id="93" name="Straight Connector 92">
-            <a:extLst>
-              <a:ext uri="{FF2B5EF4-FFF2-40B4-BE49-F238E27FC236}">
-                <a16:creationId xmlns:a16="http://schemas.microsoft.com/office/drawing/2014/main" id="{69369067-AE5E-4ED0-8801-942DC7A0173F}"/>
-              </a:ext>
-            </a:extLst>
-          </p:cNvPr>
-          <p:cNvCxnSpPr>
-            <a:cxnSpLocks/>
-          </p:cNvCxnSpPr>
-          <p:nvPr/>
-        </p:nvCxnSpPr>
-        <p:spPr>
-          <a:xfrm>
-            <a:off x="6522833" y="872052"/>
-            <a:ext cx="725667" cy="1"/>
-          </a:xfrm>
-          <a:prstGeom prst="line">
-            <a:avLst/>
-          </a:prstGeom>
-        </p:spPr>
-        <p:style>
-          <a:lnRef idx="1">
-            <a:schemeClr val="accent1"/>
-          </a:lnRef>
-          <a:fillRef idx="0">
-            <a:schemeClr val="accent1"/>
-          </a:fillRef>
-          <a:effectRef idx="0">
-            <a:schemeClr val="accent1"/>
-          </a:effectRef>
-          <a:fontRef idx="minor">
-            <a:schemeClr val="tx1"/>
-          </a:fontRef>
-        </p:style>
-      </p:cxnSp>
       <p:graphicFrame>
         <p:nvGraphicFramePr>
           <p:cNvPr id="42" name="Table 41">
@@ -4871,14 +4833,14 @@
           <p:nvPr>
             <p:extLst>
               <p:ext uri="{D42A27DB-BD31-4B8C-83A1-F6EECF244321}">
-                <p14:modId xmlns:p14="http://schemas.microsoft.com/office/powerpoint/2010/main" val="4041563742"/>
+                <p14:modId xmlns:p14="http://schemas.microsoft.com/office/powerpoint/2010/main" val="2155274731"/>
               </p:ext>
             </p:extLst>
           </p:nvPr>
         </p:nvGraphicFramePr>
         <p:xfrm>
-          <a:off x="543035" y="122030"/>
-          <a:ext cx="1210788" cy="1645920"/>
+          <a:off x="543035" y="37200"/>
+          <a:ext cx="1210788" cy="1828800"/>
         </p:xfrm>
         <a:graphic>
           <a:graphicData uri="http://schemas.openxmlformats.org/drawingml/2006/table">
@@ -5038,6 +5000,18 @@
                         <a:t>country</a:t>
                       </a:r>
                     </a:p>
+                    <a:p>
+                      <a:pPr algn="l"/>
+                      <a:r>
+                        <a:rPr lang="en-US" sz="1200" u="none" dirty="0" err="1">
+                          <a:latin typeface="Times" pitchFamily="2" charset="0"/>
+                        </a:rPr>
+                        <a:t>postal_code</a:t>
+                      </a:r>
+                      <a:endParaRPr lang="en-US" sz="1200" u="none" dirty="0">
+                        <a:latin typeface="Times" pitchFamily="2" charset="0"/>
+                      </a:endParaRPr>
+                    </a:p>
                   </a:txBody>
                   <a:tcPr>
                     <a:lnL w="9525" cap="flat" cmpd="sng" algn="ctr">
@@ -5107,7 +5081,7 @@
         </p:nvSpPr>
         <p:spPr>
           <a:xfrm>
-            <a:off x="1989520" y="556794"/>
+            <a:off x="1989520" y="558971"/>
             <a:ext cx="2056434" cy="785258"/>
           </a:xfrm>
           <a:prstGeom prst="diamond">
@@ -5175,9 +5149,9 @@
           <p:nvPr/>
         </p:nvCxnSpPr>
         <p:spPr>
-          <a:xfrm flipH="1" flipV="1">
-            <a:off x="1753823" y="944990"/>
-            <a:ext cx="235697" cy="4433"/>
+          <a:xfrm flipH="1">
+            <a:off x="1753823" y="951600"/>
+            <a:ext cx="235697" cy="0"/>
           </a:xfrm>
           <a:prstGeom prst="line">
             <a:avLst/>
@@ -5340,7 +5314,7 @@
         <p:spPr>
           <a:xfrm>
             <a:off x="3017737" y="484697"/>
-            <a:ext cx="0" cy="72097"/>
+            <a:ext cx="0" cy="74274"/>
           </a:xfrm>
           <a:prstGeom prst="line">
             <a:avLst/>
@@ -5419,8 +5393,8 @@
         </p:nvCxnSpPr>
         <p:spPr>
           <a:xfrm>
-            <a:off x="4045954" y="949423"/>
-            <a:ext cx="344766" cy="1123"/>
+            <a:off x="4045954" y="951600"/>
+            <a:ext cx="344766" cy="0"/>
           </a:xfrm>
           <a:prstGeom prst="line">
             <a:avLst/>
@@ -5699,7 +5673,7 @@
           <p:nvPr>
             <p:extLst>
               <p:ext uri="{D42A27DB-BD31-4B8C-83A1-F6EECF244321}">
-                <p14:modId xmlns:p14="http://schemas.microsoft.com/office/powerpoint/2010/main" val="1595248973"/>
+                <p14:modId xmlns:p14="http://schemas.microsoft.com/office/powerpoint/2010/main" val="3653461762"/>
               </p:ext>
             </p:extLst>
           </p:nvPr>
@@ -6912,8 +6886,8 @@
         </p:nvCxnSpPr>
         <p:spPr>
           <a:xfrm flipV="1">
-            <a:off x="1148429" y="1767950"/>
-            <a:ext cx="0" cy="485556"/>
+            <a:off x="1148429" y="1866000"/>
+            <a:ext cx="0" cy="387506"/>
           </a:xfrm>
           <a:prstGeom prst="straightConnector1">
             <a:avLst/>

</xml_diff>

<commit_message>
updated attributes and related files
removed redundant attributes (ie addresses, genre, etc)
added genre, hasGenre, ordAdd
updated .DDL, ER Diagram (.pdf, .pptx, .PNG), relation schemas
</commit_message>
<xml_diff>
--- a/documentation/ER Diagram/ER Diagram - Project - COMP3005.pptx
+++ b/documentation/ER Diagram/ER Diagram - Project - COMP3005.pptx
@@ -223,7 +223,7 @@
           <a:p>
             <a:fld id="{4EEA96E3-5376-2D42-97CA-66A886050071}" type="datetimeFigureOut">
               <a:rPr lang="en-US" smtClean="0"/>
-              <a:t>3/24/20</a:t>
+              <a:t>3/26/20</a:t>
             </a:fld>
             <a:endParaRPr lang="en-US"/>
           </a:p>
@@ -465,7 +465,7 @@
           <a:p>
             <a:fld id="{3BD378E5-F4D9-824D-8BC6-66DDB52D5CFC}" type="datetimeFigureOut">
               <a:rPr lang="en-US" smtClean="0"/>
-              <a:t>3/24/20</a:t>
+              <a:t>3/26/20</a:t>
             </a:fld>
             <a:endParaRPr lang="en-US"/>
           </a:p>
@@ -663,7 +663,7 @@
           <a:p>
             <a:fld id="{3BD378E5-F4D9-824D-8BC6-66DDB52D5CFC}" type="datetimeFigureOut">
               <a:rPr lang="en-US" smtClean="0"/>
-              <a:t>3/24/20</a:t>
+              <a:t>3/26/20</a:t>
             </a:fld>
             <a:endParaRPr lang="en-US"/>
           </a:p>
@@ -871,7 +871,7 @@
           <a:p>
             <a:fld id="{3BD378E5-F4D9-824D-8BC6-66DDB52D5CFC}" type="datetimeFigureOut">
               <a:rPr lang="en-US" smtClean="0"/>
-              <a:t>3/24/20</a:t>
+              <a:t>3/26/20</a:t>
             </a:fld>
             <a:endParaRPr lang="en-US"/>
           </a:p>
@@ -1069,7 +1069,7 @@
           <a:p>
             <a:fld id="{3BD378E5-F4D9-824D-8BC6-66DDB52D5CFC}" type="datetimeFigureOut">
               <a:rPr lang="en-US" smtClean="0"/>
-              <a:t>3/24/20</a:t>
+              <a:t>3/26/20</a:t>
             </a:fld>
             <a:endParaRPr lang="en-US"/>
           </a:p>
@@ -1344,7 +1344,7 @@
           <a:p>
             <a:fld id="{3BD378E5-F4D9-824D-8BC6-66DDB52D5CFC}" type="datetimeFigureOut">
               <a:rPr lang="en-US" smtClean="0"/>
-              <a:t>3/24/20</a:t>
+              <a:t>3/26/20</a:t>
             </a:fld>
             <a:endParaRPr lang="en-US"/>
           </a:p>
@@ -1609,7 +1609,7 @@
           <a:p>
             <a:fld id="{3BD378E5-F4D9-824D-8BC6-66DDB52D5CFC}" type="datetimeFigureOut">
               <a:rPr lang="en-US" smtClean="0"/>
-              <a:t>3/24/20</a:t>
+              <a:t>3/26/20</a:t>
             </a:fld>
             <a:endParaRPr lang="en-US"/>
           </a:p>
@@ -2021,7 +2021,7 @@
           <a:p>
             <a:fld id="{3BD378E5-F4D9-824D-8BC6-66DDB52D5CFC}" type="datetimeFigureOut">
               <a:rPr lang="en-US" smtClean="0"/>
-              <a:t>3/24/20</a:t>
+              <a:t>3/26/20</a:t>
             </a:fld>
             <a:endParaRPr lang="en-US"/>
           </a:p>
@@ -2162,7 +2162,7 @@
           <a:p>
             <a:fld id="{3BD378E5-F4D9-824D-8BC6-66DDB52D5CFC}" type="datetimeFigureOut">
               <a:rPr lang="en-US" smtClean="0"/>
-              <a:t>3/24/20</a:t>
+              <a:t>3/26/20</a:t>
             </a:fld>
             <a:endParaRPr lang="en-US"/>
           </a:p>
@@ -2275,7 +2275,7 @@
           <a:p>
             <a:fld id="{3BD378E5-F4D9-824D-8BC6-66DDB52D5CFC}" type="datetimeFigureOut">
               <a:rPr lang="en-US" smtClean="0"/>
-              <a:t>3/24/20</a:t>
+              <a:t>3/26/20</a:t>
             </a:fld>
             <a:endParaRPr lang="en-US"/>
           </a:p>
@@ -2586,7 +2586,7 @@
           <a:p>
             <a:fld id="{3BD378E5-F4D9-824D-8BC6-66DDB52D5CFC}" type="datetimeFigureOut">
               <a:rPr lang="en-US" smtClean="0"/>
-              <a:t>3/24/20</a:t>
+              <a:t>3/26/20</a:t>
             </a:fld>
             <a:endParaRPr lang="en-US"/>
           </a:p>
@@ -2874,7 +2874,7 @@
           <a:p>
             <a:fld id="{3BD378E5-F4D9-824D-8BC6-66DDB52D5CFC}" type="datetimeFigureOut">
               <a:rPr lang="en-US" smtClean="0"/>
-              <a:t>3/24/20</a:t>
+              <a:t>3/26/20</a:t>
             </a:fld>
             <a:endParaRPr lang="en-US"/>
           </a:p>
@@ -3115,7 +3115,7 @@
           <a:p>
             <a:fld id="{3BD378E5-F4D9-824D-8BC6-66DDB52D5CFC}" type="datetimeFigureOut">
               <a:rPr lang="en-US" smtClean="0"/>
-              <a:t>3/24/20</a:t>
+              <a:t>3/26/20</a:t>
             </a:fld>
             <a:endParaRPr lang="en-US"/>
           </a:p>
@@ -3547,14 +3547,14 @@
           <p:nvPr>
             <p:extLst>
               <p:ext uri="{D42A27DB-BD31-4B8C-83A1-F6EECF244321}">
-                <p14:modId xmlns:p14="http://schemas.microsoft.com/office/powerpoint/2010/main" val="3094236384"/>
+                <p14:modId xmlns:p14="http://schemas.microsoft.com/office/powerpoint/2010/main" val="3401231206"/>
               </p:ext>
             </p:extLst>
           </p:nvPr>
         </p:nvGraphicFramePr>
         <p:xfrm>
-          <a:off x="4390720" y="37200"/>
-          <a:ext cx="1210788" cy="1828800"/>
+          <a:off x="4404895" y="732729"/>
+          <a:ext cx="1210788" cy="1463040"/>
         </p:xfrm>
         <a:graphic>
           <a:graphicData uri="http://schemas.openxmlformats.org/drawingml/2006/table">
@@ -3717,30 +3717,6 @@
                         <a:t>email</a:t>
                       </a:r>
                     </a:p>
-                    <a:p>
-                      <a:pPr algn="l"/>
-                      <a:r>
-                        <a:rPr lang="en-US" sz="1200" dirty="0" err="1">
-                          <a:latin typeface="Times" pitchFamily="2" charset="0"/>
-                        </a:rPr>
-                        <a:t>shipping_add</a:t>
-                      </a:r>
-                      <a:endParaRPr lang="en-US" sz="1200" dirty="0">
-                        <a:latin typeface="Times" pitchFamily="2" charset="0"/>
-                      </a:endParaRPr>
-                    </a:p>
-                    <a:p>
-                      <a:pPr algn="l"/>
-                      <a:r>
-                        <a:rPr lang="en-US" sz="1200" dirty="0" err="1">
-                          <a:latin typeface="Times" pitchFamily="2" charset="0"/>
-                        </a:rPr>
-                        <a:t>billing_add</a:t>
-                      </a:r>
-                      <a:endParaRPr lang="en-US" sz="1200" dirty="0">
-                        <a:latin typeface="Times" pitchFamily="2" charset="0"/>
-                      </a:endParaRPr>
-                    </a:p>
                   </a:txBody>
                   <a:tcPr>
                     <a:lnL w="9525" cap="flat" cmpd="sng" algn="ctr">
@@ -3811,13 +3787,13 @@
           <p:nvPr>
             <p:extLst>
               <p:ext uri="{D42A27DB-BD31-4B8C-83A1-F6EECF244321}">
-                <p14:modId xmlns:p14="http://schemas.microsoft.com/office/powerpoint/2010/main" val="2343558751"/>
+                <p14:modId xmlns:p14="http://schemas.microsoft.com/office/powerpoint/2010/main" val="2535792937"/>
               </p:ext>
             </p:extLst>
           </p:nvPr>
         </p:nvGraphicFramePr>
         <p:xfrm>
-          <a:off x="10974362" y="5392188"/>
+          <a:off x="10535093" y="79519"/>
           <a:ext cx="1078230" cy="1163257"/>
         </p:xfrm>
         <a:graphic>
@@ -4027,13 +4003,13 @@
           <p:nvPr>
             <p:extLst>
               <p:ext uri="{D42A27DB-BD31-4B8C-83A1-F6EECF244321}">
-                <p14:modId xmlns:p14="http://schemas.microsoft.com/office/powerpoint/2010/main" val="1937181067"/>
+                <p14:modId xmlns:p14="http://schemas.microsoft.com/office/powerpoint/2010/main" val="312704684"/>
               </p:ext>
             </p:extLst>
           </p:nvPr>
         </p:nvGraphicFramePr>
         <p:xfrm>
-          <a:off x="8625975" y="3962556"/>
+          <a:off x="8625975" y="4177716"/>
           <a:ext cx="1078230" cy="586570"/>
         </p:xfrm>
         <a:graphic>
@@ -4207,7 +4183,7 @@
         </p:nvCxnSpPr>
         <p:spPr>
           <a:xfrm flipH="1">
-            <a:off x="7917149" y="4255841"/>
+            <a:off x="7917149" y="4471001"/>
             <a:ext cx="708826" cy="0"/>
           </a:xfrm>
           <a:prstGeom prst="line">
@@ -4240,15 +4216,15 @@
           </p:cNvPr>
           <p:cNvCxnSpPr>
             <a:cxnSpLocks/>
-            <a:stCxn id="78" idx="1"/>
-            <a:endCxn id="4" idx="2"/>
+            <a:stCxn id="78" idx="0"/>
+            <a:endCxn id="4" idx="3"/>
           </p:cNvCxnSpPr>
           <p:nvPr/>
         </p:nvCxnSpPr>
         <p:spPr>
-          <a:xfrm rot="10800000">
-            <a:off x="4996114" y="1866000"/>
-            <a:ext cx="3190592" cy="1086538"/>
+          <a:xfrm rot="16200000" flipV="1">
+            <a:off x="6641700" y="438232"/>
+            <a:ext cx="1497374" cy="3549407"/>
           </a:xfrm>
           <a:prstGeom prst="bentConnector2">
             <a:avLst/>
@@ -4291,8 +4267,8 @@
         </p:nvCxnSpPr>
         <p:spPr>
           <a:xfrm>
-            <a:off x="9165090" y="3459836"/>
-            <a:ext cx="0" cy="502720"/>
+            <a:off x="9165090" y="3976220"/>
+            <a:ext cx="0" cy="201496"/>
           </a:xfrm>
           <a:prstGeom prst="line">
             <a:avLst/>
@@ -4328,15 +4304,15 @@
           </p:cNvPr>
           <p:cNvCxnSpPr>
             <a:cxnSpLocks/>
-            <a:stCxn id="100" idx="0"/>
-            <a:endCxn id="13" idx="2"/>
+            <a:stCxn id="100" idx="1"/>
+            <a:endCxn id="13" idx="3"/>
           </p:cNvCxnSpPr>
           <p:nvPr/>
         </p:nvCxnSpPr>
         <p:spPr>
-          <a:xfrm flipV="1">
-            <a:off x="9165090" y="4549126"/>
-            <a:ext cx="0" cy="917393"/>
+          <a:xfrm flipH="1">
+            <a:off x="9704205" y="4471000"/>
+            <a:ext cx="391619" cy="1"/>
           </a:xfrm>
           <a:prstGeom prst="line">
             <a:avLst/>
@@ -4368,15 +4344,15 @@
           </p:cNvPr>
           <p:cNvCxnSpPr>
             <a:cxnSpLocks/>
-            <a:stCxn id="100" idx="3"/>
-            <a:endCxn id="76" idx="1"/>
+            <a:stCxn id="100" idx="0"/>
+            <a:endCxn id="76" idx="2"/>
           </p:cNvCxnSpPr>
           <p:nvPr/>
         </p:nvCxnSpPr>
         <p:spPr>
           <a:xfrm flipV="1">
-            <a:off x="10143474" y="5973816"/>
-            <a:ext cx="830888" cy="2"/>
+            <a:off x="11074208" y="1242776"/>
+            <a:ext cx="0" cy="2720925"/>
           </a:xfrm>
           <a:prstGeom prst="line">
             <a:avLst/>
@@ -4416,13 +4392,13 @@
           <p:nvPr>
             <p:extLst>
               <p:ext uri="{D42A27DB-BD31-4B8C-83A1-F6EECF244321}">
-                <p14:modId xmlns:p14="http://schemas.microsoft.com/office/powerpoint/2010/main" val="622675927"/>
+                <p14:modId xmlns:p14="http://schemas.microsoft.com/office/powerpoint/2010/main" val="1287250420"/>
               </p:ext>
             </p:extLst>
           </p:nvPr>
         </p:nvGraphicFramePr>
         <p:xfrm>
-          <a:off x="6536704" y="674312"/>
+          <a:off x="4404895" y="2728314"/>
           <a:ext cx="1210788" cy="554574"/>
         </p:xfrm>
         <a:graphic>
@@ -4451,7 +4427,7 @@
                         <a:rPr lang="en-US" sz="1200" b="0" dirty="0">
                           <a:latin typeface="Times" pitchFamily="2" charset="0"/>
                         </a:rPr>
-                        <a:t>librarian</a:t>
+                        <a:t>librarian </a:t>
                       </a:r>
                     </a:p>
                   </a:txBody>
@@ -4589,7 +4565,7 @@
         </p:nvSpPr>
         <p:spPr>
           <a:xfrm>
-            <a:off x="8186706" y="2445239"/>
+            <a:off x="8186706" y="2961623"/>
             <a:ext cx="1956768" cy="1014597"/>
           </a:xfrm>
           <a:prstGeom prst="diamond">
@@ -4655,7 +4631,7 @@
         </p:nvSpPr>
         <p:spPr>
           <a:xfrm>
-            <a:off x="8186706" y="5466519"/>
+            <a:off x="10095824" y="3963701"/>
             <a:ext cx="1956768" cy="1014597"/>
           </a:xfrm>
           <a:prstGeom prst="diamond">
@@ -4714,9 +4690,9 @@
           <p:nvPr/>
         </p:nvGrpSpPr>
         <p:grpSpPr>
-          <a:xfrm rot="16200000">
-            <a:off x="6039400" y="507295"/>
-            <a:ext cx="78253" cy="888611"/>
+          <a:xfrm>
+            <a:off x="4925172" y="2208811"/>
+            <a:ext cx="129295" cy="519502"/>
             <a:chOff x="4991321" y="1224855"/>
             <a:chExt cx="45719" cy="852211"/>
           </a:xfrm>
@@ -4833,13 +4809,13 @@
           <p:nvPr>
             <p:extLst>
               <p:ext uri="{D42A27DB-BD31-4B8C-83A1-F6EECF244321}">
-                <p14:modId xmlns:p14="http://schemas.microsoft.com/office/powerpoint/2010/main" val="2155274731"/>
+                <p14:modId xmlns:p14="http://schemas.microsoft.com/office/powerpoint/2010/main" val="1015369490"/>
               </p:ext>
             </p:extLst>
           </p:nvPr>
         </p:nvGraphicFramePr>
         <p:xfrm>
-          <a:off x="543035" y="37200"/>
+          <a:off x="543035" y="553584"/>
           <a:ext cx="1210788" cy="1828800"/>
         </p:xfrm>
         <a:graphic>
@@ -5081,7 +5057,7 @@
         </p:nvSpPr>
         <p:spPr>
           <a:xfrm>
-            <a:off x="1989520" y="558971"/>
+            <a:off x="1989520" y="1075355"/>
             <a:ext cx="2056434" cy="785258"/>
           </a:xfrm>
           <a:prstGeom prst="diamond">
@@ -5150,7 +5126,7 @@
         </p:nvCxnSpPr>
         <p:spPr>
           <a:xfrm flipH="1">
-            <a:off x="1753823" y="951600"/>
+            <a:off x="1753823" y="1467984"/>
             <a:ext cx="235697" cy="0"/>
           </a:xfrm>
           <a:prstGeom prst="line">
@@ -5187,13 +5163,13 @@
           <p:nvPr>
             <p:extLst>
               <p:ext uri="{D42A27DB-BD31-4B8C-83A1-F6EECF244321}">
-                <p14:modId xmlns:p14="http://schemas.microsoft.com/office/powerpoint/2010/main" val="217603634"/>
+                <p14:modId xmlns:p14="http://schemas.microsoft.com/office/powerpoint/2010/main" val="2898935154"/>
               </p:ext>
             </p:extLst>
           </p:nvPr>
         </p:nvGraphicFramePr>
         <p:xfrm>
-          <a:off x="2412343" y="27497"/>
+          <a:off x="2412343" y="543881"/>
           <a:ext cx="1210788" cy="457200"/>
         </p:xfrm>
         <a:graphic>
@@ -5313,7 +5289,7 @@
         </p:nvCxnSpPr>
         <p:spPr>
           <a:xfrm>
-            <a:off x="3017737" y="484697"/>
+            <a:off x="3017737" y="1001081"/>
             <a:ext cx="0" cy="74274"/>
           </a:xfrm>
           <a:prstGeom prst="line">
@@ -5352,7 +5328,7 @@
         </p:nvSpPr>
         <p:spPr>
           <a:xfrm>
-            <a:off x="3993288" y="730821"/>
+            <a:off x="3993288" y="1247205"/>
             <a:ext cx="415498" cy="276999"/>
           </a:xfrm>
           <a:prstGeom prst="rect">
@@ -5392,9 +5368,9 @@
           <p:nvPr/>
         </p:nvCxnSpPr>
         <p:spPr>
-          <a:xfrm>
-            <a:off x="4045954" y="951600"/>
-            <a:ext cx="344766" cy="0"/>
+          <a:xfrm flipV="1">
+            <a:off x="4045954" y="1464249"/>
+            <a:ext cx="358941" cy="3735"/>
           </a:xfrm>
           <a:prstGeom prst="line">
             <a:avLst/>
@@ -5430,14 +5406,14 @@
           <p:nvPr>
             <p:extLst>
               <p:ext uri="{D42A27DB-BD31-4B8C-83A1-F6EECF244321}">
-                <p14:modId xmlns:p14="http://schemas.microsoft.com/office/powerpoint/2010/main" val="1698360583"/>
+                <p14:modId xmlns:p14="http://schemas.microsoft.com/office/powerpoint/2010/main" val="738176707"/>
               </p:ext>
             </p:extLst>
           </p:nvPr>
         </p:nvGraphicFramePr>
         <p:xfrm>
-          <a:off x="4456999" y="3341441"/>
-          <a:ext cx="1078230" cy="1828800"/>
+          <a:off x="4471174" y="3653069"/>
+          <a:ext cx="1078230" cy="1645920"/>
         </p:xfrm>
         <a:graphic>
           <a:graphicData uri="http://schemas.openxmlformats.org/drawingml/2006/table">
@@ -5558,15 +5534,6 @@
                     <a:p>
                       <a:pPr algn="l"/>
                       <a:r>
-                        <a:rPr lang="en-US" sz="1200" dirty="0">
-                          <a:latin typeface="Times" pitchFamily="2" charset="0"/>
-                        </a:rPr>
-                        <a:t>genre</a:t>
-                      </a:r>
-                    </a:p>
-                    <a:p>
-                      <a:pPr algn="l"/>
-                      <a:r>
                         <a:rPr lang="en-US" sz="1200" dirty="0" err="1">
                           <a:latin typeface="Times" pitchFamily="2" charset="0"/>
                         </a:rPr>
@@ -5673,14 +5640,14 @@
           <p:nvPr>
             <p:extLst>
               <p:ext uri="{D42A27DB-BD31-4B8C-83A1-F6EECF244321}">
-                <p14:modId xmlns:p14="http://schemas.microsoft.com/office/powerpoint/2010/main" val="3653461762"/>
+                <p14:modId xmlns:p14="http://schemas.microsoft.com/office/powerpoint/2010/main" val="1701284790"/>
               </p:ext>
             </p:extLst>
           </p:nvPr>
         </p:nvGraphicFramePr>
         <p:xfrm>
-          <a:off x="609314" y="3524320"/>
-          <a:ext cx="1078230" cy="1463040"/>
+          <a:off x="609314" y="3830920"/>
+          <a:ext cx="1078230" cy="1280160"/>
         </p:xfrm>
         <a:graphic>
           <a:graphicData uri="http://schemas.openxmlformats.org/drawingml/2006/table">
@@ -5792,15 +5759,6 @@
                     <a:p>
                       <a:pPr algn="l"/>
                       <a:r>
-                        <a:rPr lang="en-US" sz="1200" dirty="0">
-                          <a:latin typeface="Times" pitchFamily="2" charset="0"/>
-                        </a:rPr>
-                        <a:t>address</a:t>
-                      </a:r>
-                    </a:p>
-                    <a:p>
-                      <a:pPr algn="l"/>
-                      <a:r>
                         <a:rPr lang="en-US" sz="1200" dirty="0" err="1">
                           <a:latin typeface="Times" pitchFamily="2" charset="0"/>
                         </a:rPr>
@@ -5904,13 +5862,13 @@
           <p:nvPr>
             <p:extLst>
               <p:ext uri="{D42A27DB-BD31-4B8C-83A1-F6EECF244321}">
-                <p14:modId xmlns:p14="http://schemas.microsoft.com/office/powerpoint/2010/main" val="1391328338"/>
+                <p14:modId xmlns:p14="http://schemas.microsoft.com/office/powerpoint/2010/main" val="2758799903"/>
               </p:ext>
             </p:extLst>
           </p:nvPr>
         </p:nvGraphicFramePr>
         <p:xfrm>
-          <a:off x="2478622" y="5492000"/>
+          <a:off x="6399650" y="5694339"/>
           <a:ext cx="1078230" cy="1097280"/>
         </p:xfrm>
         <a:graphic>
@@ -6128,9 +6086,9 @@
           <p:nvPr/>
         </p:nvCxnSpPr>
         <p:spPr>
-          <a:xfrm>
-            <a:off x="4996114" y="5170241"/>
-            <a:ext cx="0" cy="363101"/>
+          <a:xfrm flipH="1">
+            <a:off x="4996114" y="5298989"/>
+            <a:ext cx="14175" cy="436692"/>
           </a:xfrm>
           <a:prstGeom prst="straightConnector1">
             <a:avLst/>
@@ -6162,15 +6120,15 @@
           </p:cNvPr>
           <p:cNvCxnSpPr>
             <a:cxnSpLocks/>
-            <a:stCxn id="90" idx="3"/>
-            <a:endCxn id="103" idx="1"/>
+            <a:stCxn id="90" idx="1"/>
+            <a:endCxn id="103" idx="3"/>
           </p:cNvCxnSpPr>
           <p:nvPr/>
         </p:nvCxnSpPr>
         <p:spPr>
-          <a:xfrm>
-            <a:off x="3556852" y="6040640"/>
-            <a:ext cx="460878" cy="1"/>
+          <a:xfrm flipH="1">
+            <a:off x="5974498" y="6242979"/>
+            <a:ext cx="425152" cy="1"/>
           </a:xfrm>
           <a:prstGeom prst="line">
             <a:avLst/>
@@ -6209,8 +6167,8 @@
         </p:nvCxnSpPr>
         <p:spPr>
           <a:xfrm flipH="1">
-            <a:off x="5535229" y="4255841"/>
-            <a:ext cx="425152" cy="0"/>
+            <a:off x="5549404" y="4471001"/>
+            <a:ext cx="410977" cy="5028"/>
           </a:xfrm>
           <a:prstGeom prst="line">
             <a:avLst/>
@@ -6249,7 +6207,7 @@
         </p:nvCxnSpPr>
         <p:spPr>
           <a:xfrm flipH="1" flipV="1">
-            <a:off x="1687544" y="4255840"/>
+            <a:off x="1687544" y="4471000"/>
             <a:ext cx="351809" cy="1"/>
           </a:xfrm>
           <a:prstGeom prst="line">
@@ -6293,8 +6251,8 @@
         </p:nvCxnSpPr>
         <p:spPr>
           <a:xfrm>
-            <a:off x="3996121" y="4255841"/>
-            <a:ext cx="460878" cy="0"/>
+            <a:off x="3996121" y="4471001"/>
+            <a:ext cx="475053" cy="5028"/>
           </a:xfrm>
           <a:prstGeom prst="line">
             <a:avLst/>
@@ -6330,13 +6288,13 @@
           <p:nvPr>
             <p:extLst>
               <p:ext uri="{D42A27DB-BD31-4B8C-83A1-F6EECF244321}">
-                <p14:modId xmlns:p14="http://schemas.microsoft.com/office/powerpoint/2010/main" val="607080131"/>
+                <p14:modId xmlns:p14="http://schemas.microsoft.com/office/powerpoint/2010/main" val="74937198"/>
               </p:ext>
             </p:extLst>
           </p:nvPr>
         </p:nvGraphicFramePr>
         <p:xfrm>
-          <a:off x="6600423" y="5130307"/>
+          <a:off x="6600423" y="5151825"/>
           <a:ext cx="684670" cy="315661"/>
         </p:xfrm>
         <a:graphic>
@@ -6441,8 +6399,8 @@
         </p:nvCxnSpPr>
         <p:spPr>
           <a:xfrm>
-            <a:off x="6938765" y="4763139"/>
-            <a:ext cx="3993" cy="367168"/>
+            <a:off x="6938765" y="4978299"/>
+            <a:ext cx="3993" cy="173526"/>
           </a:xfrm>
           <a:prstGeom prst="line">
             <a:avLst/>
@@ -6481,13 +6439,13 @@
           <p:nvPr>
             <p:extLst>
               <p:ext uri="{D42A27DB-BD31-4B8C-83A1-F6EECF244321}">
-                <p14:modId xmlns:p14="http://schemas.microsoft.com/office/powerpoint/2010/main" val="3054723283"/>
+                <p14:modId xmlns:p14="http://schemas.microsoft.com/office/powerpoint/2010/main" val="2080914008"/>
               </p:ext>
             </p:extLst>
           </p:nvPr>
         </p:nvGraphicFramePr>
         <p:xfrm>
-          <a:off x="2675402" y="3261791"/>
+          <a:off x="2675402" y="3476951"/>
           <a:ext cx="684670" cy="315661"/>
         </p:xfrm>
         <a:graphic>
@@ -6592,7 +6550,7 @@
         </p:nvCxnSpPr>
         <p:spPr>
           <a:xfrm flipV="1">
-            <a:off x="3017737" y="3577452"/>
+            <a:off x="3017737" y="3792612"/>
             <a:ext cx="0" cy="171090"/>
           </a:xfrm>
           <a:prstGeom prst="line">
@@ -6631,7 +6589,7 @@
         </p:nvSpPr>
         <p:spPr>
           <a:xfrm>
-            <a:off x="4017730" y="5533342"/>
+            <a:off x="4017730" y="5735681"/>
             <a:ext cx="1956768" cy="1014597"/>
           </a:xfrm>
           <a:prstGeom prst="diamond">
@@ -6691,7 +6649,7 @@
         </p:nvSpPr>
         <p:spPr>
           <a:xfrm>
-            <a:off x="2039353" y="3748542"/>
+            <a:off x="2039353" y="3963702"/>
             <a:ext cx="1956768" cy="1014597"/>
           </a:xfrm>
           <a:prstGeom prst="diamond">
@@ -6751,7 +6709,7 @@
         </p:nvSpPr>
         <p:spPr>
           <a:xfrm>
-            <a:off x="5960381" y="3748542"/>
+            <a:off x="5960381" y="3963702"/>
             <a:ext cx="1956768" cy="1014597"/>
           </a:xfrm>
           <a:prstGeom prst="diamond">
@@ -6817,7 +6775,7 @@
         </p:nvSpPr>
         <p:spPr>
           <a:xfrm>
-            <a:off x="120212" y="2253506"/>
+            <a:off x="120212" y="2759132"/>
             <a:ext cx="2056434" cy="785258"/>
           </a:xfrm>
           <a:prstGeom prst="diamond">
@@ -6879,14 +6837,14 @@
             </a:extLst>
           </p:cNvPr>
           <p:cNvCxnSpPr>
-            <a:stCxn id="162" idx="0"/>
+            <a:cxnSpLocks/>
             <a:endCxn id="42" idx="2"/>
           </p:cNvCxnSpPr>
           <p:nvPr/>
         </p:nvCxnSpPr>
         <p:spPr>
           <a:xfrm flipV="1">
-            <a:off x="1148429" y="1866000"/>
+            <a:off x="1148429" y="2382384"/>
             <a:ext cx="0" cy="387506"/>
           </a:xfrm>
           <a:prstGeom prst="straightConnector1">
@@ -6928,8 +6886,8 @@
         </p:nvCxnSpPr>
         <p:spPr>
           <a:xfrm>
-            <a:off x="1148429" y="3038764"/>
-            <a:ext cx="0" cy="485556"/>
+            <a:off x="1148429" y="3544390"/>
+            <a:ext cx="0" cy="286530"/>
           </a:xfrm>
           <a:prstGeom prst="line">
             <a:avLst/>
@@ -6950,6 +6908,512 @@
           </a:fontRef>
         </p:style>
       </p:cxnSp>
+      <p:sp>
+        <p:nvSpPr>
+          <p:cNvPr id="44" name="Diamond 43">
+            <a:extLst>
+              <a:ext uri="{FF2B5EF4-FFF2-40B4-BE49-F238E27FC236}">
+                <a16:creationId xmlns:a16="http://schemas.microsoft.com/office/drawing/2014/main" id="{61E67EF2-6C1E-964E-BC05-48D35F3DACF6}"/>
+              </a:ext>
+            </a:extLst>
+          </p:cNvPr>
+          <p:cNvSpPr/>
+          <p:nvPr/>
+        </p:nvSpPr>
+        <p:spPr>
+          <a:xfrm>
+            <a:off x="1912271" y="5735681"/>
+            <a:ext cx="1956768" cy="1014597"/>
+          </a:xfrm>
+          <a:prstGeom prst="diamond">
+            <a:avLst/>
+          </a:prstGeom>
+          <a:solidFill>
+            <a:schemeClr val="accent5">
+              <a:lumMod val="40000"/>
+              <a:lumOff val="60000"/>
+            </a:schemeClr>
+          </a:solidFill>
+        </p:spPr>
+        <p:style>
+          <a:lnRef idx="2">
+            <a:schemeClr val="accent1">
+              <a:shade val="50000"/>
+            </a:schemeClr>
+          </a:lnRef>
+          <a:fillRef idx="1">
+            <a:schemeClr val="accent1"/>
+          </a:fillRef>
+          <a:effectRef idx="0">
+            <a:schemeClr val="accent1"/>
+          </a:effectRef>
+          <a:fontRef idx="minor">
+            <a:schemeClr val="lt1"/>
+          </a:fontRef>
+        </p:style>
+        <p:txBody>
+          <a:bodyPr rtlCol="0" anchor="ctr"/>
+          <a:lstStyle/>
+          <a:p>
+            <a:pPr algn="ctr"/>
+            <a:r>
+              <a:rPr lang="en-US" sz="1100" i="1" dirty="0" err="1">
+                <a:solidFill>
+                  <a:sysClr val="windowText" lastClr="000000"/>
+                </a:solidFill>
+                <a:latin typeface="Times" pitchFamily="2" charset="0"/>
+              </a:rPr>
+              <a:t>hasGenre</a:t>
+            </a:r>
+            <a:endParaRPr lang="en-US" sz="1100" i="1" dirty="0">
+              <a:solidFill>
+                <a:sysClr val="windowText" lastClr="000000"/>
+              </a:solidFill>
+              <a:latin typeface="Times" pitchFamily="2" charset="0"/>
+            </a:endParaRPr>
+          </a:p>
+        </p:txBody>
+      </p:sp>
+      <p:sp>
+        <p:nvSpPr>
+          <p:cNvPr id="67" name="Diamond 66">
+            <a:extLst>
+              <a:ext uri="{FF2B5EF4-FFF2-40B4-BE49-F238E27FC236}">
+                <a16:creationId xmlns:a16="http://schemas.microsoft.com/office/drawing/2014/main" id="{94D87A82-005D-6344-BA02-89FEF11745E4}"/>
+              </a:ext>
+            </a:extLst>
+          </p:cNvPr>
+          <p:cNvSpPr/>
+          <p:nvPr/>
+        </p:nvSpPr>
+        <p:spPr>
+          <a:xfrm>
+            <a:off x="7321071" y="147752"/>
+            <a:ext cx="1956768" cy="1014597"/>
+          </a:xfrm>
+          <a:prstGeom prst="diamond">
+            <a:avLst/>
+          </a:prstGeom>
+          <a:solidFill>
+            <a:schemeClr val="accent5">
+              <a:lumMod val="40000"/>
+              <a:lumOff val="60000"/>
+            </a:schemeClr>
+          </a:solidFill>
+        </p:spPr>
+        <p:style>
+          <a:lnRef idx="2">
+            <a:schemeClr val="accent1">
+              <a:shade val="50000"/>
+            </a:schemeClr>
+          </a:lnRef>
+          <a:fillRef idx="1">
+            <a:schemeClr val="accent1"/>
+          </a:fillRef>
+          <a:effectRef idx="0">
+            <a:schemeClr val="accent1"/>
+          </a:effectRef>
+          <a:fontRef idx="minor">
+            <a:schemeClr val="lt1"/>
+          </a:fontRef>
+        </p:style>
+        <p:txBody>
+          <a:bodyPr rtlCol="0" anchor="ctr"/>
+          <a:lstStyle/>
+          <a:p>
+            <a:pPr algn="ctr"/>
+            <a:r>
+              <a:rPr lang="en-US" sz="1100" i="1" dirty="0" err="1">
+                <a:solidFill>
+                  <a:sysClr val="windowText" lastClr="000000"/>
+                </a:solidFill>
+                <a:latin typeface="Times" pitchFamily="2" charset="0"/>
+              </a:rPr>
+              <a:t>ordAdd</a:t>
+            </a:r>
+            <a:endParaRPr lang="en-US" sz="1100" i="1" dirty="0">
+              <a:solidFill>
+                <a:sysClr val="windowText" lastClr="000000"/>
+              </a:solidFill>
+              <a:latin typeface="Times" pitchFamily="2" charset="0"/>
+            </a:endParaRPr>
+          </a:p>
+        </p:txBody>
+      </p:sp>
+      <p:cxnSp>
+        <p:nvCxnSpPr>
+          <p:cNvPr id="31" name="Straight Connector 30">
+            <a:extLst>
+              <a:ext uri="{FF2B5EF4-FFF2-40B4-BE49-F238E27FC236}">
+                <a16:creationId xmlns:a16="http://schemas.microsoft.com/office/drawing/2014/main" id="{63D9CA3B-DC87-9044-B8E9-6504E370D1C8}"/>
+              </a:ext>
+            </a:extLst>
+          </p:cNvPr>
+          <p:cNvCxnSpPr>
+            <a:stCxn id="67" idx="3"/>
+            <a:endCxn id="76" idx="1"/>
+          </p:cNvCxnSpPr>
+          <p:nvPr/>
+        </p:nvCxnSpPr>
+        <p:spPr>
+          <a:xfrm>
+            <a:off x="9277839" y="655051"/>
+            <a:ext cx="1257254" cy="6096"/>
+          </a:xfrm>
+          <a:prstGeom prst="line">
+            <a:avLst/>
+          </a:prstGeom>
+        </p:spPr>
+        <p:style>
+          <a:lnRef idx="1">
+            <a:schemeClr val="accent1"/>
+          </a:lnRef>
+          <a:fillRef idx="0">
+            <a:schemeClr val="accent1"/>
+          </a:fillRef>
+          <a:effectRef idx="0">
+            <a:schemeClr val="accent1"/>
+          </a:effectRef>
+          <a:fontRef idx="minor">
+            <a:schemeClr val="tx1"/>
+          </a:fontRef>
+        </p:style>
+      </p:cxnSp>
+      <p:cxnSp>
+        <p:nvCxnSpPr>
+          <p:cNvPr id="33" name="Straight Connector 32">
+            <a:extLst>
+              <a:ext uri="{FF2B5EF4-FFF2-40B4-BE49-F238E27FC236}">
+                <a16:creationId xmlns:a16="http://schemas.microsoft.com/office/drawing/2014/main" id="{20C882C6-65CC-B74A-BD2E-98AC44C2E40E}"/>
+              </a:ext>
+            </a:extLst>
+          </p:cNvPr>
+          <p:cNvCxnSpPr>
+            <a:cxnSpLocks/>
+            <a:stCxn id="67" idx="0"/>
+            <a:endCxn id="42" idx="0"/>
+          </p:cNvCxnSpPr>
+          <p:nvPr/>
+        </p:nvCxnSpPr>
+        <p:spPr>
+          <a:xfrm rot="16200000" flipH="1" flipV="1">
+            <a:off x="4521026" y="-3224845"/>
+            <a:ext cx="405832" cy="7151026"/>
+          </a:xfrm>
+          <a:prstGeom prst="bentConnector3">
+            <a:avLst>
+              <a:gd name="adj1" fmla="val -19218"/>
+            </a:avLst>
+          </a:prstGeom>
+        </p:spPr>
+        <p:style>
+          <a:lnRef idx="1">
+            <a:schemeClr val="accent1"/>
+          </a:lnRef>
+          <a:fillRef idx="0">
+            <a:schemeClr val="accent1"/>
+          </a:fillRef>
+          <a:effectRef idx="0">
+            <a:schemeClr val="accent1"/>
+          </a:effectRef>
+          <a:fontRef idx="minor">
+            <a:schemeClr val="tx1"/>
+          </a:fontRef>
+        </p:style>
+      </p:cxnSp>
+      <p:cxnSp>
+        <p:nvCxnSpPr>
+          <p:cNvPr id="40" name="Straight Connector 39">
+            <a:extLst>
+              <a:ext uri="{FF2B5EF4-FFF2-40B4-BE49-F238E27FC236}">
+                <a16:creationId xmlns:a16="http://schemas.microsoft.com/office/drawing/2014/main" id="{2D199835-FFD1-614B-87A0-5B0288FA2D1F}"/>
+              </a:ext>
+            </a:extLst>
+          </p:cNvPr>
+          <p:cNvCxnSpPr>
+            <a:cxnSpLocks/>
+            <a:stCxn id="86" idx="1"/>
+            <a:endCxn id="44" idx="3"/>
+          </p:cNvCxnSpPr>
+          <p:nvPr/>
+        </p:nvCxnSpPr>
+        <p:spPr>
+          <a:xfrm flipH="1">
+            <a:off x="3869039" y="4476029"/>
+            <a:ext cx="602135" cy="1766951"/>
+          </a:xfrm>
+          <a:prstGeom prst="line">
+            <a:avLst/>
+          </a:prstGeom>
+        </p:spPr>
+        <p:style>
+          <a:lnRef idx="1">
+            <a:schemeClr val="accent1"/>
+          </a:lnRef>
+          <a:fillRef idx="0">
+            <a:schemeClr val="accent1"/>
+          </a:fillRef>
+          <a:effectRef idx="0">
+            <a:schemeClr val="accent1"/>
+          </a:effectRef>
+          <a:fontRef idx="minor">
+            <a:schemeClr val="tx1"/>
+          </a:fontRef>
+        </p:style>
+      </p:cxnSp>
+      <p:graphicFrame>
+        <p:nvGraphicFramePr>
+          <p:cNvPr id="82" name="Table 81">
+            <a:extLst>
+              <a:ext uri="{FF2B5EF4-FFF2-40B4-BE49-F238E27FC236}">
+                <a16:creationId xmlns:a16="http://schemas.microsoft.com/office/drawing/2014/main" id="{98159C5B-E692-3C47-83C7-FD8A52BDA46E}"/>
+              </a:ext>
+            </a:extLst>
+          </p:cNvPr>
+          <p:cNvGraphicFramePr>
+            <a:graphicFrameLocks noGrp="1"/>
+          </p:cNvGraphicFramePr>
+          <p:nvPr>
+            <p:extLst>
+              <p:ext uri="{D42A27DB-BD31-4B8C-83A1-F6EECF244321}">
+                <p14:modId xmlns:p14="http://schemas.microsoft.com/office/powerpoint/2010/main" val="712926186"/>
+              </p:ext>
+            </p:extLst>
+          </p:nvPr>
+        </p:nvGraphicFramePr>
+        <p:xfrm>
+          <a:off x="575080" y="5917473"/>
+          <a:ext cx="1078230" cy="651012"/>
+        </p:xfrm>
+        <a:graphic>
+          <a:graphicData uri="http://schemas.openxmlformats.org/drawingml/2006/table">
+            <a:tbl>
+              <a:tblPr firstRow="1" bandRow="1">
+                <a:tableStyleId>{5FD0F851-EC5A-4D38-B0AD-8093EC10F338}</a:tableStyleId>
+              </a:tblPr>
+              <a:tblGrid>
+                <a:gridCol w="1078230">
+                  <a:extLst>
+                    <a:ext uri="{9D8B030D-6E8A-4147-A177-3AD203B41FA5}">
+                      <a16:colId xmlns:a16="http://schemas.microsoft.com/office/drawing/2014/main" val="1069656790"/>
+                    </a:ext>
+                  </a:extLst>
+                </a:gridCol>
+              </a:tblGrid>
+              <a:tr h="213290">
+                <a:tc>
+                  <a:txBody>
+                    <a:bodyPr/>
+                    <a:lstStyle/>
+                    <a:p>
+                      <a:pPr algn="ctr"/>
+                      <a:r>
+                        <a:rPr lang="en-US" sz="1200" b="0" dirty="0">
+                          <a:latin typeface="Times" pitchFamily="2" charset="0"/>
+                        </a:rPr>
+                        <a:t>genre</a:t>
+                      </a:r>
+                    </a:p>
+                  </a:txBody>
+                  <a:tcPr anchor="ctr">
+                    <a:lnL w="9525" cap="flat" cmpd="sng" algn="ctr">
+                      <a:solidFill>
+                        <a:schemeClr val="tx1"/>
+                      </a:solidFill>
+                      <a:prstDash val="solid"/>
+                      <a:round/>
+                      <a:headEnd type="none" w="med" len="med"/>
+                      <a:tailEnd type="none" w="med" len="med"/>
+                    </a:lnL>
+                    <a:lnR w="9525" cap="flat" cmpd="sng" algn="ctr">
+                      <a:solidFill>
+                        <a:schemeClr val="tx1"/>
+                      </a:solidFill>
+                      <a:prstDash val="solid"/>
+                      <a:round/>
+                      <a:headEnd type="none" w="med" len="med"/>
+                      <a:tailEnd type="none" w="med" len="med"/>
+                    </a:lnR>
+                    <a:lnT w="9525" cap="flat" cmpd="sng" algn="ctr">
+                      <a:solidFill>
+                        <a:schemeClr val="tx1"/>
+                      </a:solidFill>
+                      <a:prstDash val="solid"/>
+                      <a:round/>
+                      <a:headEnd type="none" w="med" len="med"/>
+                      <a:tailEnd type="none" w="med" len="med"/>
+                    </a:lnT>
+                    <a:lnB w="9525" cap="flat" cmpd="sng" algn="ctr">
+                      <a:solidFill>
+                        <a:schemeClr val="tx1"/>
+                      </a:solidFill>
+                      <a:prstDash val="solid"/>
+                      <a:round/>
+                      <a:headEnd type="none" w="med" len="med"/>
+                      <a:tailEnd type="none" w="med" len="med"/>
+                    </a:lnB>
+                    <a:solidFill>
+                      <a:schemeClr val="accent5">
+                        <a:lumMod val="40000"/>
+                        <a:lumOff val="60000"/>
+                      </a:schemeClr>
+                    </a:solidFill>
+                  </a:tcPr>
+                </a:tc>
+                <a:extLst>
+                  <a:ext uri="{0D108BD9-81ED-4DB2-BD59-A6C34878D82A}">
+                    <a16:rowId xmlns:a16="http://schemas.microsoft.com/office/drawing/2014/main" val="3513791863"/>
+                  </a:ext>
+                </a:extLst>
+              </a:tr>
+              <a:tr h="376692">
+                <a:tc>
+                  <a:txBody>
+                    <a:bodyPr/>
+                    <a:lstStyle/>
+                    <a:p>
+                      <a:pPr algn="l"/>
+                      <a:r>
+                        <a:rPr lang="en-US" sz="1200" u="sng" dirty="0">
+                          <a:latin typeface="Times" pitchFamily="2" charset="0"/>
+                        </a:rPr>
+                        <a:t>name</a:t>
+                      </a:r>
+                      <a:endParaRPr lang="en-US" sz="1200" dirty="0">
+                        <a:latin typeface="Times" pitchFamily="2" charset="0"/>
+                      </a:endParaRPr>
+                    </a:p>
+                  </a:txBody>
+                  <a:tcPr>
+                    <a:lnL w="9525" cap="flat" cmpd="sng" algn="ctr">
+                      <a:solidFill>
+                        <a:schemeClr val="tx1"/>
+                      </a:solidFill>
+                      <a:prstDash val="solid"/>
+                      <a:round/>
+                      <a:headEnd type="none" w="med" len="med"/>
+                      <a:tailEnd type="none" w="med" len="med"/>
+                    </a:lnL>
+                    <a:lnR w="9525" cap="flat" cmpd="sng" algn="ctr">
+                      <a:solidFill>
+                        <a:schemeClr val="tx1"/>
+                      </a:solidFill>
+                      <a:prstDash val="solid"/>
+                      <a:round/>
+                      <a:headEnd type="none" w="med" len="med"/>
+                      <a:tailEnd type="none" w="med" len="med"/>
+                    </a:lnR>
+                    <a:lnT w="9525" cap="flat" cmpd="sng" algn="ctr">
+                      <a:solidFill>
+                        <a:schemeClr val="tx1"/>
+                      </a:solidFill>
+                      <a:prstDash val="solid"/>
+                      <a:round/>
+                      <a:headEnd type="none" w="med" len="med"/>
+                      <a:tailEnd type="none" w="med" len="med"/>
+                    </a:lnT>
+                    <a:lnB w="9525" cap="flat" cmpd="sng" algn="ctr">
+                      <a:solidFill>
+                        <a:schemeClr val="tx1"/>
+                      </a:solidFill>
+                      <a:prstDash val="solid"/>
+                      <a:round/>
+                      <a:headEnd type="none" w="med" len="med"/>
+                      <a:tailEnd type="none" w="med" len="med"/>
+                    </a:lnB>
+                    <a:solidFill>
+                      <a:schemeClr val="bg1">
+                        <a:alpha val="20000"/>
+                      </a:schemeClr>
+                    </a:solidFill>
+                  </a:tcPr>
+                </a:tc>
+                <a:extLst>
+                  <a:ext uri="{0D108BD9-81ED-4DB2-BD59-A6C34878D82A}">
+                    <a16:rowId xmlns:a16="http://schemas.microsoft.com/office/drawing/2014/main" val="2009406627"/>
+                  </a:ext>
+                </a:extLst>
+              </a:tr>
+            </a:tbl>
+          </a:graphicData>
+        </a:graphic>
+      </p:graphicFrame>
+      <p:cxnSp>
+        <p:nvCxnSpPr>
+          <p:cNvPr id="50" name="Straight Connector 49">
+            <a:extLst>
+              <a:ext uri="{FF2B5EF4-FFF2-40B4-BE49-F238E27FC236}">
+                <a16:creationId xmlns:a16="http://schemas.microsoft.com/office/drawing/2014/main" id="{B1E9F676-A224-3D4C-A139-664E9DEDF133}"/>
+              </a:ext>
+            </a:extLst>
+          </p:cNvPr>
+          <p:cNvCxnSpPr>
+            <a:stCxn id="44" idx="1"/>
+            <a:endCxn id="82" idx="3"/>
+          </p:cNvCxnSpPr>
+          <p:nvPr/>
+        </p:nvCxnSpPr>
+        <p:spPr>
+          <a:xfrm flipH="1" flipV="1">
+            <a:off x="1653310" y="6242979"/>
+            <a:ext cx="258961" cy="1"/>
+          </a:xfrm>
+          <a:prstGeom prst="line">
+            <a:avLst/>
+          </a:prstGeom>
+        </p:spPr>
+        <p:style>
+          <a:lnRef idx="1">
+            <a:schemeClr val="accent1"/>
+          </a:lnRef>
+          <a:fillRef idx="0">
+            <a:schemeClr val="accent1"/>
+          </a:fillRef>
+          <a:effectRef idx="0">
+            <a:schemeClr val="accent1"/>
+          </a:effectRef>
+          <a:fontRef idx="minor">
+            <a:schemeClr val="tx1"/>
+          </a:fontRef>
+        </p:style>
+      </p:cxnSp>
+      <p:sp>
+        <p:nvSpPr>
+          <p:cNvPr id="91" name="TextBox 90">
+            <a:extLst>
+              <a:ext uri="{FF2B5EF4-FFF2-40B4-BE49-F238E27FC236}">
+                <a16:creationId xmlns:a16="http://schemas.microsoft.com/office/drawing/2014/main" id="{A07B3577-53E2-B149-B09B-A32EDB75A351}"/>
+              </a:ext>
+            </a:extLst>
+          </p:cNvPr>
+          <p:cNvSpPr txBox="1"/>
+          <p:nvPr/>
+        </p:nvSpPr>
+        <p:spPr>
+          <a:xfrm>
+            <a:off x="10285392" y="428156"/>
+            <a:ext cx="261610" cy="276999"/>
+          </a:xfrm>
+          <a:prstGeom prst="rect">
+            <a:avLst/>
+          </a:prstGeom>
+          <a:noFill/>
+        </p:spPr>
+        <p:txBody>
+          <a:bodyPr wrap="none" rtlCol="0">
+            <a:spAutoFit/>
+          </a:bodyPr>
+          <a:lstStyle/>
+          <a:p>
+            <a:r>
+              <a:rPr lang="en-US" sz="1200" i="1" dirty="0">
+                <a:latin typeface="Times" pitchFamily="2" charset="0"/>
+              </a:rPr>
+              <a:t>2</a:t>
+            </a:r>
+          </a:p>
+        </p:txBody>
+      </p:sp>
     </p:spTree>
     <p:extLst>
       <p:ext uri="{BB962C8B-B14F-4D97-AF65-F5344CB8AC3E}">

</xml_diff>

<commit_message>
new baskets assigned, stock updated, prints a message to order more books, not very descriptive tho
</commit_message>
<xml_diff>
--- a/documentation/ER Diagram/ER Diagram - Project - COMP3005.pptx
+++ b/documentation/ER Diagram/ER Diagram - Project - COMP3005.pptx
@@ -4282,9 +4282,9 @@
           <a:prstGeom prst="line">
             <a:avLst/>
           </a:prstGeom>
-          <a:ln w="6350" cmpd="sng">
+          <a:ln w="38100" cmpd="dbl">
             <a:headEnd type="none"/>
-            <a:tailEnd type="triangle"/>
+            <a:tailEnd type="none"/>
           </a:ln>
         </p:spPr>
         <p:style>

</xml_diff>